<commit_message>
Added popup and typo in presentation
</commit_message>
<xml_diff>
--- a/Presentations/info final presentation.pptx
+++ b/Presentations/info final presentation.pptx
@@ -7832,7 +7832,9 @@
         </p:nvSpPr>
         <p:spPr/>
         <p:txBody>
-          <a:bodyPr/>
+          <a:bodyPr>
+            <a:normAutofit/>
+          </a:bodyPr>
           <a:lstStyle/>
           <a:p>
             <a:r>
@@ -7861,7 +7863,7 @@
           <a:p>
             <a:r>
               <a:rPr lang="en-US" dirty="0"/>
-              <a:t>When using colors, paying attention to the color schemes is important for </a:t>
+              <a:t>When using colors, paying attention to the color schemes is important for colorblind people</a:t>
             </a:r>
           </a:p>
           <a:p>
@@ -7883,18 +7885,6 @@
               <a:rPr lang="en-GB" dirty="0"/>
               <a:t> the interface simple and clear to the user</a:t>
             </a:r>
-          </a:p>
-          <a:p>
-            <a:endParaRPr lang="en-US" dirty="0"/>
-          </a:p>
-          <a:p>
-            <a:endParaRPr lang="en-US" dirty="0"/>
-          </a:p>
-          <a:p>
-            <a:pPr marL="0" indent="0">
-              <a:buNone/>
-            </a:pPr>
-            <a:endParaRPr lang="en-US" dirty="0"/>
           </a:p>
         </p:txBody>
       </p:sp>

</xml_diff>